<commit_message>
Updated Logic and Storage design diagrams
Added WorkerServlet
Comment, FeedbackResponseComment
FeedbackResponseCommentDb
</commit_message>
<xml_diff>
--- a/doc/diagrams/LogicComponent.pptx
+++ b/doc/diagrams/LogicComponent.pptx
@@ -193,7 +193,7 @@
             <a:fld id="{AF301891-4E62-472A-98E9-95DBD40531A4}" type="datetimeFigureOut">
               <a:rPr lang="en-SG" smtClean="0"/>
               <a:pPr/>
-              <a:t>4/1/2014</a:t>
+              <a:t>6/5/2014</a:t>
             </a:fld>
             <a:endParaRPr lang="en-SG"/>
           </a:p>
@@ -748,7 +748,7 @@
             <a:fld id="{1D8BD707-D9CF-40AE-B4C6-C98DA3205C09}" type="datetimeFigureOut">
               <a:rPr lang="en-US" smtClean="0"/>
               <a:pPr/>
-              <a:t>1/4/2014</a:t>
+              <a:t>5/6/2014</a:t>
             </a:fld>
             <a:endParaRPr lang="en-US"/>
           </a:p>
@@ -962,7 +962,7 @@
             <a:fld id="{1D8BD707-D9CF-40AE-B4C6-C98DA3205C09}" type="datetimeFigureOut">
               <a:rPr lang="en-US" smtClean="0"/>
               <a:pPr/>
-              <a:t>1/4/2014</a:t>
+              <a:t>5/6/2014</a:t>
             </a:fld>
             <a:endParaRPr lang="en-US"/>
           </a:p>
@@ -1169,7 +1169,7 @@
             <a:fld id="{1D8BD707-D9CF-40AE-B4C6-C98DA3205C09}" type="datetimeFigureOut">
               <a:rPr lang="en-US" smtClean="0"/>
               <a:pPr/>
-              <a:t>1/4/2014</a:t>
+              <a:t>5/6/2014</a:t>
             </a:fld>
             <a:endParaRPr lang="en-US"/>
           </a:p>
@@ -1376,7 +1376,7 @@
             <a:fld id="{1D8BD707-D9CF-40AE-B4C6-C98DA3205C09}" type="datetimeFigureOut">
               <a:rPr lang="en-US" smtClean="0"/>
               <a:pPr/>
-              <a:t>1/4/2014</a:t>
+              <a:t>5/6/2014</a:t>
             </a:fld>
             <a:endParaRPr lang="en-US"/>
           </a:p>
@@ -1649,7 +1649,7 @@
             <a:fld id="{1D8BD707-D9CF-40AE-B4C6-C98DA3205C09}" type="datetimeFigureOut">
               <a:rPr lang="en-US" smtClean="0"/>
               <a:pPr/>
-              <a:t>1/4/2014</a:t>
+              <a:t>5/6/2014</a:t>
             </a:fld>
             <a:endParaRPr lang="en-US"/>
           </a:p>
@@ -1972,7 +1972,7 @@
             <a:fld id="{1D8BD707-D9CF-40AE-B4C6-C98DA3205C09}" type="datetimeFigureOut">
               <a:rPr lang="en-US" smtClean="0"/>
               <a:pPr/>
-              <a:t>1/4/2014</a:t>
+              <a:t>5/6/2014</a:t>
             </a:fld>
             <a:endParaRPr lang="en-US"/>
           </a:p>
@@ -2435,7 +2435,7 @@
             <a:fld id="{1D8BD707-D9CF-40AE-B4C6-C98DA3205C09}" type="datetimeFigureOut">
               <a:rPr lang="en-US" smtClean="0"/>
               <a:pPr/>
-              <a:t>1/4/2014</a:t>
+              <a:t>5/6/2014</a:t>
             </a:fld>
             <a:endParaRPr lang="en-US"/>
           </a:p>
@@ -2582,7 +2582,7 @@
             <a:fld id="{1D8BD707-D9CF-40AE-B4C6-C98DA3205C09}" type="datetimeFigureOut">
               <a:rPr lang="en-US" smtClean="0"/>
               <a:pPr/>
-              <a:t>1/4/2014</a:t>
+              <a:t>5/6/2014</a:t>
             </a:fld>
             <a:endParaRPr lang="en-US"/>
           </a:p>
@@ -2698,7 +2698,7 @@
             <a:fld id="{1D8BD707-D9CF-40AE-B4C6-C98DA3205C09}" type="datetimeFigureOut">
               <a:rPr lang="en-US" smtClean="0"/>
               <a:pPr/>
-              <a:t>1/4/2014</a:t>
+              <a:t>5/6/2014</a:t>
             </a:fld>
             <a:endParaRPr lang="en-US"/>
           </a:p>
@@ -3005,7 +3005,7 @@
             <a:fld id="{1D8BD707-D9CF-40AE-B4C6-C98DA3205C09}" type="datetimeFigureOut">
               <a:rPr lang="en-US" smtClean="0"/>
               <a:pPr/>
-              <a:t>1/4/2014</a:t>
+              <a:t>5/6/2014</a:t>
             </a:fld>
             <a:endParaRPr lang="en-US"/>
           </a:p>
@@ -3288,7 +3288,7 @@
             <a:fld id="{1D8BD707-D9CF-40AE-B4C6-C98DA3205C09}" type="datetimeFigureOut">
               <a:rPr lang="en-US" smtClean="0"/>
               <a:pPr/>
-              <a:t>1/4/2014</a:t>
+              <a:t>5/6/2014</a:t>
             </a:fld>
             <a:endParaRPr lang="en-US"/>
           </a:p>
@@ -3391,8 +3391,8 @@
         </p:nvSpPr>
         <p:spPr>
           <a:xfrm>
-            <a:off x="1295400" y="117742"/>
-            <a:ext cx="6400800" cy="6740257"/>
+            <a:off x="914400" y="117742"/>
+            <a:ext cx="6781800" cy="6740257"/>
           </a:xfrm>
           <a:prstGeom prst="roundRect">
             <a:avLst>
@@ -3450,10 +3450,10 @@
         </p:nvGrpSpPr>
         <p:grpSpPr>
           <a:xfrm>
-            <a:off x="2131864" y="188786"/>
-            <a:ext cx="2258240" cy="2153095"/>
-            <a:chOff x="-828261" y="1447800"/>
-            <a:chExt cx="1971261" cy="2254474"/>
+            <a:off x="1066801" y="536618"/>
+            <a:ext cx="3323303" cy="1805262"/>
+            <a:chOff x="-1757975" y="1812010"/>
+            <a:chExt cx="2900975" cy="1890263"/>
           </a:xfrm>
           <a:solidFill>
             <a:schemeClr val="bg1"/>
@@ -3467,8 +3467,8 @@
           </p:nvSpPr>
           <p:spPr>
             <a:xfrm>
-              <a:off x="-828261" y="1524002"/>
-              <a:ext cx="1971261" cy="2178272"/>
+              <a:off x="-1757975" y="1888427"/>
+              <a:ext cx="2900975" cy="1813846"/>
             </a:xfrm>
             <a:prstGeom prst="rect">
               <a:avLst/>
@@ -3535,7 +3535,7 @@
           </p:nvSpPr>
           <p:spPr>
             <a:xfrm>
-              <a:off x="647700" y="1447800"/>
+              <a:off x="647700" y="1812010"/>
               <a:ext cx="495300" cy="76200"/>
             </a:xfrm>
             <a:prstGeom prst="rect">
@@ -3720,10 +3720,10 @@
         </p:nvGrpSpPr>
         <p:grpSpPr>
           <a:xfrm>
-            <a:off x="2131865" y="2418080"/>
-            <a:ext cx="2258241" cy="2209800"/>
+            <a:off x="1066801" y="2418080"/>
+            <a:ext cx="3323304" cy="2209800"/>
             <a:chOff x="-613964" y="1447800"/>
-            <a:chExt cx="1756964" cy="2071687"/>
+            <a:chExt cx="1756963" cy="2071687"/>
           </a:xfrm>
           <a:solidFill>
             <a:schemeClr val="bg1"/>
@@ -3797,8 +3797,8 @@
           </p:nvSpPr>
           <p:spPr>
             <a:xfrm>
-              <a:off x="647700" y="1447800"/>
-              <a:ext cx="495300" cy="76200"/>
+              <a:off x="843022" y="1447800"/>
+              <a:ext cx="299977" cy="76200"/>
             </a:xfrm>
             <a:prstGeom prst="rect">
               <a:avLst/>
@@ -3851,8 +3851,8 @@
         </p:nvGrpSpPr>
         <p:grpSpPr>
           <a:xfrm>
-            <a:off x="1371600" y="4724400"/>
-            <a:ext cx="6019800" cy="1905000"/>
+            <a:off x="1066800" y="4724400"/>
+            <a:ext cx="6324600" cy="1905000"/>
             <a:chOff x="-4876800" y="1451133"/>
             <a:chExt cx="6019800" cy="1628650"/>
           </a:xfrm>
@@ -4370,13 +4370,15 @@
       <p:cxnSp>
         <p:nvCxnSpPr>
           <p:cNvPr id="48" name="Straight Arrow Connector 47"/>
-          <p:cNvCxnSpPr/>
+          <p:cNvCxnSpPr>
+            <a:endCxn id="49" idx="1"/>
+          </p:cNvCxnSpPr>
           <p:nvPr/>
         </p:nvCxnSpPr>
         <p:spPr>
           <a:xfrm flipV="1">
-            <a:off x="1143000" y="1382618"/>
-            <a:ext cx="990600" cy="9627"/>
+            <a:off x="762000" y="1635999"/>
+            <a:ext cx="1626853" cy="15011"/>
           </a:xfrm>
           <a:prstGeom prst="straightConnector1">
             <a:avLst/>
@@ -4556,7 +4558,7 @@
         </p:nvSpPr>
         <p:spPr>
           <a:xfrm rot="16200000">
-            <a:off x="1824774" y="3437212"/>
+            <a:off x="1443774" y="3437212"/>
             <a:ext cx="1645397" cy="418146"/>
           </a:xfrm>
           <a:prstGeom prst="rect">
@@ -4683,14 +4685,15 @@
         <p:nvCxnSpPr>
           <p:cNvPr id="55" name="Straight Arrow Connector 54"/>
           <p:cNvCxnSpPr>
+            <a:stCxn id="52" idx="2"/>
             <a:endCxn id="51" idx="0"/>
           </p:cNvCxnSpPr>
           <p:nvPr/>
         </p:nvCxnSpPr>
         <p:spPr>
-          <a:xfrm flipV="1">
-            <a:off x="2895600" y="3646287"/>
-            <a:ext cx="383137" cy="1"/>
+          <a:xfrm>
+            <a:off x="2475546" y="3646285"/>
+            <a:ext cx="803191" cy="2"/>
           </a:xfrm>
           <a:prstGeom prst="straightConnector1">
             <a:avLst/>
@@ -4727,7 +4730,7 @@
         </p:nvCxnSpPr>
         <p:spPr>
           <a:xfrm flipV="1">
-            <a:off x="1143000" y="3646285"/>
+            <a:off x="762000" y="3646285"/>
             <a:ext cx="1295400" cy="4"/>
           </a:xfrm>
           <a:prstGeom prst="straightConnector1">
@@ -4764,8 +4767,8 @@
         </p:nvSpPr>
         <p:spPr>
           <a:xfrm>
-            <a:off x="5241634" y="5024280"/>
-            <a:ext cx="1905000" cy="533400"/>
+            <a:off x="5543641" y="5024280"/>
+            <a:ext cx="1574380" cy="533400"/>
           </a:xfrm>
           <a:prstGeom prst="rect">
             <a:avLst/>
@@ -4808,8 +4811,8 @@
         </p:nvSpPr>
         <p:spPr>
           <a:xfrm>
-            <a:off x="5231051" y="5881624"/>
-            <a:ext cx="2038928" cy="533400"/>
+            <a:off x="5544680" y="5881624"/>
+            <a:ext cx="1685065" cy="533400"/>
           </a:xfrm>
           <a:prstGeom prst="rect">
             <a:avLst/>
@@ -4986,7 +4989,7 @@
         </p:nvSpPr>
         <p:spPr>
           <a:xfrm>
-            <a:off x="523775" y="1230219"/>
+            <a:off x="152400" y="1458392"/>
             <a:ext cx="609600" cy="307777"/>
           </a:xfrm>
           <a:prstGeom prst="rect">
@@ -5109,7 +5112,7 @@
         </p:nvSpPr>
         <p:spPr>
           <a:xfrm>
-            <a:off x="152400" y="3442479"/>
+            <a:off x="-152400" y="3442479"/>
             <a:ext cx="937901" cy="307777"/>
           </a:xfrm>
           <a:prstGeom prst="rect">
@@ -5269,7 +5272,7 @@
         </p:nvCxnSpPr>
         <p:spPr>
           <a:xfrm flipV="1">
-            <a:off x="3386411" y="6521244"/>
+            <a:off x="4122430" y="6521244"/>
             <a:ext cx="0" cy="381000"/>
           </a:xfrm>
           <a:prstGeom prst="straightConnector1">
@@ -5306,7 +5309,7 @@
         </p:nvSpPr>
         <p:spPr>
           <a:xfrm>
-            <a:off x="2489103" y="6823067"/>
+            <a:off x="3225122" y="6823067"/>
             <a:ext cx="1816337" cy="307777"/>
           </a:xfrm>
           <a:prstGeom prst="rect">
@@ -6019,7 +6022,7 @@
         </p:nvSpPr>
         <p:spPr>
           <a:xfrm>
-            <a:off x="2388853" y="620619"/>
+            <a:off x="2388853" y="788640"/>
             <a:ext cx="1676400" cy="506760"/>
           </a:xfrm>
           <a:prstGeom prst="rect">
@@ -6144,8 +6147,8 @@
         </p:nvSpPr>
         <p:spPr>
           <a:xfrm>
-            <a:off x="5174670" y="5941660"/>
-            <a:ext cx="2038928" cy="533400"/>
+            <a:off x="5488299" y="5941660"/>
+            <a:ext cx="1685065" cy="533400"/>
           </a:xfrm>
           <a:prstGeom prst="rect">
             <a:avLst/>
@@ -6199,8 +6202,8 @@
         </p:nvSpPr>
         <p:spPr>
           <a:xfrm>
-            <a:off x="5105400" y="5987844"/>
-            <a:ext cx="2038928" cy="533400"/>
+            <a:off x="5419029" y="5987844"/>
+            <a:ext cx="1685065" cy="533400"/>
           </a:xfrm>
           <a:prstGeom prst="rect">
             <a:avLst/>
@@ -6247,7 +6250,7 @@
         </p:nvSpPr>
         <p:spPr>
           <a:xfrm>
-            <a:off x="5986751" y="5553915"/>
+            <a:off x="6123448" y="5553915"/>
             <a:ext cx="276225" cy="228600"/>
           </a:xfrm>
           <a:prstGeom prst="triangle">
@@ -6290,8 +6293,8 @@
         </p:nvCxnSpPr>
         <p:spPr>
           <a:xfrm>
-            <a:off x="6124864" y="5782515"/>
-            <a:ext cx="0" cy="205329"/>
+            <a:off x="6261561" y="5782515"/>
+            <a:ext cx="1" cy="205329"/>
           </a:xfrm>
           <a:prstGeom prst="line">
             <a:avLst/>
@@ -6322,7 +6325,7 @@
         </p:nvSpPr>
         <p:spPr>
           <a:xfrm>
-            <a:off x="2332551" y="5068524"/>
+            <a:off x="3068570" y="5068524"/>
             <a:ext cx="1905000" cy="533400"/>
           </a:xfrm>
           <a:prstGeom prst="rect">
@@ -6373,8 +6376,8 @@
         </p:nvSpPr>
         <p:spPr>
           <a:xfrm>
-            <a:off x="2321968" y="5896372"/>
-            <a:ext cx="2038928" cy="533400"/>
+            <a:off x="3150666" y="5896372"/>
+            <a:ext cx="1853571" cy="533400"/>
           </a:xfrm>
           <a:prstGeom prst="rect">
             <a:avLst/>
@@ -6428,8 +6431,8 @@
         </p:nvSpPr>
         <p:spPr>
           <a:xfrm>
-            <a:off x="2265587" y="5956408"/>
-            <a:ext cx="2038928" cy="533400"/>
+            <a:off x="3094285" y="5956408"/>
+            <a:ext cx="1853571" cy="533400"/>
           </a:xfrm>
           <a:prstGeom prst="rect">
             <a:avLst/>
@@ -6483,8 +6486,8 @@
         </p:nvSpPr>
         <p:spPr>
           <a:xfrm>
-            <a:off x="2196317" y="6002592"/>
-            <a:ext cx="2038928" cy="533400"/>
+            <a:off x="3025015" y="6002592"/>
+            <a:ext cx="1853571" cy="533400"/>
           </a:xfrm>
           <a:prstGeom prst="rect">
             <a:avLst/>
@@ -6538,7 +6541,7 @@
         </p:nvSpPr>
         <p:spPr>
           <a:xfrm>
-            <a:off x="3077668" y="5598159"/>
+            <a:off x="3813687" y="5598159"/>
             <a:ext cx="276225" cy="228600"/>
           </a:xfrm>
           <a:prstGeom prst="triangle">
@@ -6581,8 +6584,8 @@
         </p:nvCxnSpPr>
         <p:spPr>
           <a:xfrm>
-            <a:off x="3215781" y="5826759"/>
-            <a:ext cx="0" cy="175833"/>
+            <a:off x="3951800" y="5826759"/>
+            <a:ext cx="1" cy="175833"/>
           </a:xfrm>
           <a:prstGeom prst="line">
             <a:avLst/>
@@ -6613,7 +6616,7 @@
         </p:nvCxnSpPr>
         <p:spPr>
           <a:xfrm flipV="1">
-            <a:off x="6183273" y="6521244"/>
+            <a:off x="6319970" y="6521244"/>
             <a:ext cx="0" cy="381000"/>
           </a:xfrm>
           <a:prstGeom prst="straightConnector1">
@@ -6650,7 +6653,7 @@
         </p:nvSpPr>
         <p:spPr>
           <a:xfrm>
-            <a:off x="4953000" y="6823067"/>
+            <a:off x="5089697" y="6823067"/>
             <a:ext cx="2149303" cy="307777"/>
           </a:xfrm>
           <a:prstGeom prst="rect">
@@ -6755,15 +6758,7 @@
                   <a:schemeClr val="tx1"/>
                 </a:solidFill>
               </a:rPr>
-              <a:t>App engine </a:t>
-            </a:r>
-            <a:r>
-              <a:rPr lang="en-US" dirty="0" smtClean="0">
-                <a:solidFill>
-                  <a:schemeClr val="tx1"/>
-                </a:solidFill>
-              </a:rPr>
-              <a:t>task queues</a:t>
+              <a:t>App engine task queues</a:t>
             </a:r>
             <a:endParaRPr lang="en-SG" dirty="0">
               <a:solidFill>
@@ -6783,8 +6778,8 @@
         </p:nvCxnSpPr>
         <p:spPr>
           <a:xfrm>
-            <a:off x="4360896" y="6163072"/>
-            <a:ext cx="754782" cy="15794"/>
+            <a:off x="5004237" y="6163072"/>
+            <a:ext cx="390260" cy="0"/>
           </a:xfrm>
           <a:prstGeom prst="straightConnector1">
             <a:avLst/>
@@ -6811,6 +6806,252 @@
           </a:fillRef>
           <a:effectRef idx="0">
             <a:schemeClr val="accent2"/>
+          </a:effectRef>
+          <a:fontRef idx="minor">
+            <a:schemeClr val="lt1"/>
+          </a:fontRef>
+        </p:style>
+      </p:cxnSp>
+      <p:sp>
+        <p:nvSpPr>
+          <p:cNvPr id="88" name="Rectangle 87"/>
+          <p:cNvSpPr/>
+          <p:nvPr/>
+        </p:nvSpPr>
+        <p:spPr>
+          <a:xfrm>
+            <a:off x="1246818" y="5105400"/>
+            <a:ext cx="1431255" cy="533400"/>
+          </a:xfrm>
+          <a:prstGeom prst="rect">
+            <a:avLst/>
+          </a:prstGeom>
+        </p:spPr>
+        <p:style>
+          <a:lnRef idx="2">
+            <a:schemeClr val="accent3">
+              <a:shade val="50000"/>
+            </a:schemeClr>
+          </a:lnRef>
+          <a:fillRef idx="1">
+            <a:schemeClr val="accent3"/>
+          </a:fillRef>
+          <a:effectRef idx="0">
+            <a:schemeClr val="accent3"/>
+          </a:effectRef>
+          <a:fontRef idx="minor">
+            <a:schemeClr val="lt1"/>
+          </a:fontRef>
+        </p:style>
+        <p:txBody>
+          <a:bodyPr rtlCol="0" anchor="ctr"/>
+          <a:lstStyle/>
+          <a:p>
+            <a:pPr algn="ctr"/>
+            <a:r>
+              <a:rPr lang="en-US" sz="1600" b="1" dirty="0" err="1" smtClean="0"/>
+              <a:t>WorkerServlet</a:t>
+            </a:r>
+            <a:endParaRPr lang="en-SG" sz="1600" b="1" dirty="0"/>
+          </a:p>
+        </p:txBody>
+      </p:sp>
+      <p:sp>
+        <p:nvSpPr>
+          <p:cNvPr id="89" name="Rectangle 88"/>
+          <p:cNvSpPr/>
+          <p:nvPr/>
+        </p:nvSpPr>
+        <p:spPr>
+          <a:xfrm>
+            <a:off x="1287523" y="5971865"/>
+            <a:ext cx="1531877" cy="400751"/>
+          </a:xfrm>
+          <a:prstGeom prst="rect">
+            <a:avLst/>
+          </a:prstGeom>
+        </p:spPr>
+        <p:style>
+          <a:lnRef idx="2">
+            <a:schemeClr val="accent3">
+              <a:shade val="50000"/>
+            </a:schemeClr>
+          </a:lnRef>
+          <a:fillRef idx="1">
+            <a:schemeClr val="accent3"/>
+          </a:fillRef>
+          <a:effectRef idx="0">
+            <a:schemeClr val="accent3"/>
+          </a:effectRef>
+          <a:fontRef idx="minor">
+            <a:schemeClr val="lt1"/>
+          </a:fontRef>
+        </p:style>
+        <p:txBody>
+          <a:bodyPr rtlCol="0" anchor="ctr"/>
+          <a:lstStyle/>
+          <a:p>
+            <a:pPr algn="ctr"/>
+            <a:endParaRPr lang="en-SG" sz="1600" b="1" dirty="0"/>
+          </a:p>
+        </p:txBody>
+      </p:sp>
+      <p:sp>
+        <p:nvSpPr>
+          <p:cNvPr id="99" name="Rectangle 98"/>
+          <p:cNvSpPr/>
+          <p:nvPr/>
+        </p:nvSpPr>
+        <p:spPr>
+          <a:xfrm>
+            <a:off x="1231142" y="6031901"/>
+            <a:ext cx="1531877" cy="400751"/>
+          </a:xfrm>
+          <a:prstGeom prst="rect">
+            <a:avLst/>
+          </a:prstGeom>
+        </p:spPr>
+        <p:style>
+          <a:lnRef idx="2">
+            <a:schemeClr val="accent3">
+              <a:shade val="50000"/>
+            </a:schemeClr>
+          </a:lnRef>
+          <a:fillRef idx="1">
+            <a:schemeClr val="accent3"/>
+          </a:fillRef>
+          <a:effectRef idx="0">
+            <a:schemeClr val="accent3"/>
+          </a:effectRef>
+          <a:fontRef idx="minor">
+            <a:schemeClr val="lt1"/>
+          </a:fontRef>
+        </p:style>
+        <p:txBody>
+          <a:bodyPr rtlCol="0" anchor="ctr"/>
+          <a:lstStyle/>
+          <a:p>
+            <a:pPr algn="ctr"/>
+            <a:endParaRPr lang="en-SG" sz="1600" b="1" dirty="0"/>
+          </a:p>
+        </p:txBody>
+      </p:sp>
+      <p:sp>
+        <p:nvSpPr>
+          <p:cNvPr id="100" name="Rectangle 99"/>
+          <p:cNvSpPr/>
+          <p:nvPr/>
+        </p:nvSpPr>
+        <p:spPr>
+          <a:xfrm>
+            <a:off x="1139269" y="6097459"/>
+            <a:ext cx="1531877" cy="400751"/>
+          </a:xfrm>
+          <a:prstGeom prst="rect">
+            <a:avLst/>
+          </a:prstGeom>
+        </p:spPr>
+        <p:style>
+          <a:lnRef idx="2">
+            <a:schemeClr val="accent3">
+              <a:shade val="50000"/>
+            </a:schemeClr>
+          </a:lnRef>
+          <a:fillRef idx="1">
+            <a:schemeClr val="accent3"/>
+          </a:fillRef>
+          <a:effectRef idx="0">
+            <a:schemeClr val="accent3"/>
+          </a:effectRef>
+          <a:fontRef idx="minor">
+            <a:schemeClr val="lt1"/>
+          </a:fontRef>
+        </p:style>
+        <p:txBody>
+          <a:bodyPr rtlCol="0" anchor="ctr"/>
+          <a:lstStyle/>
+          <a:p>
+            <a:pPr algn="ctr"/>
+            <a:r>
+              <a:rPr lang="en-US" sz="1600" b="1" dirty="0" smtClean="0"/>
+              <a:t>*</a:t>
+            </a:r>
+            <a:r>
+              <a:rPr lang="en-US" sz="1600" b="1" dirty="0" err="1" smtClean="0"/>
+              <a:t>WorkerServlet</a:t>
+            </a:r>
+            <a:endParaRPr lang="en-SG" sz="1600" b="1" dirty="0"/>
+          </a:p>
+        </p:txBody>
+      </p:sp>
+      <p:sp>
+        <p:nvSpPr>
+          <p:cNvPr id="101" name="Isosceles Triangle 100"/>
+          <p:cNvSpPr/>
+          <p:nvPr/>
+        </p:nvSpPr>
+        <p:spPr>
+          <a:xfrm>
+            <a:off x="1767095" y="5635035"/>
+            <a:ext cx="276225" cy="228600"/>
+          </a:xfrm>
+          <a:prstGeom prst="triangle">
+            <a:avLst/>
+          </a:prstGeom>
+        </p:spPr>
+        <p:style>
+          <a:lnRef idx="2">
+            <a:schemeClr val="accent3">
+              <a:shade val="50000"/>
+            </a:schemeClr>
+          </a:lnRef>
+          <a:fillRef idx="1">
+            <a:schemeClr val="accent3"/>
+          </a:fillRef>
+          <a:effectRef idx="0">
+            <a:schemeClr val="accent3"/>
+          </a:effectRef>
+          <a:fontRef idx="minor">
+            <a:schemeClr val="lt1"/>
+          </a:fontRef>
+        </p:style>
+        <p:txBody>
+          <a:bodyPr rtlCol="0" anchor="ctr"/>
+          <a:lstStyle/>
+          <a:p>
+            <a:pPr algn="ctr"/>
+            <a:endParaRPr lang="en-SG" sz="1600" b="1"/>
+          </a:p>
+        </p:txBody>
+      </p:sp>
+      <p:cxnSp>
+        <p:nvCxnSpPr>
+          <p:cNvPr id="102" name="Straight Connector 101"/>
+          <p:cNvCxnSpPr>
+            <a:endCxn id="100" idx="0"/>
+          </p:cNvCxnSpPr>
+          <p:nvPr/>
+        </p:nvCxnSpPr>
+        <p:spPr>
+          <a:xfrm>
+            <a:off x="1905208" y="5847815"/>
+            <a:ext cx="0" cy="237756"/>
+          </a:xfrm>
+          <a:prstGeom prst="line">
+            <a:avLst/>
+          </a:prstGeom>
+        </p:spPr>
+        <p:style>
+          <a:lnRef idx="2">
+            <a:schemeClr val="accent3">
+              <a:shade val="50000"/>
+            </a:schemeClr>
+          </a:lnRef>
+          <a:fillRef idx="1">
+            <a:schemeClr val="accent3"/>
+          </a:fillRef>
+          <a:effectRef idx="0">
+            <a:schemeClr val="accent3"/>
           </a:effectRef>
           <a:fontRef idx="minor">
             <a:schemeClr val="lt1"/>

</xml_diff>